<commit_message>
EDUFUN TECHNIK COURSE CURICULLUM.pptx
</commit_message>
<xml_diff>
--- a/Presentations/EDUFUN TECHNIK COURSE CURICULLUM.pptx
+++ b/Presentations/EDUFUN TECHNIK COURSE CURICULLUM.pptx
@@ -241,7 +241,7 @@
           <a:p>
             <a:fld id="{1D8BD707-D9CF-40AE-B4C6-C98DA3205C09}" type="datetimeFigureOut">
               <a:rPr lang="en-US" smtClean="0"/>
-              <a:t>09-Sep-22</a:t>
+              <a:t>13-Jun-23</a:t>
             </a:fld>
             <a:endParaRPr lang="en-US"/>
           </a:p>
@@ -544,7 +544,7 @@
           <a:p>
             <a:fld id="{1D8BD707-D9CF-40AE-B4C6-C98DA3205C09}" type="datetimeFigureOut">
               <a:rPr lang="en-US" smtClean="0"/>
-              <a:t>09-Sep-22</a:t>
+              <a:t>13-Jun-23</a:t>
             </a:fld>
             <a:endParaRPr lang="en-US"/>
           </a:p>
@@ -723,7 +723,7 @@
           <a:p>
             <a:fld id="{1D8BD707-D9CF-40AE-B4C6-C98DA3205C09}" type="datetimeFigureOut">
               <a:rPr lang="en-US" smtClean="0"/>
-              <a:t>09-Sep-22</a:t>
+              <a:t>13-Jun-23</a:t>
             </a:fld>
             <a:endParaRPr lang="en-US"/>
           </a:p>
@@ -892,7 +892,7 @@
           <a:p>
             <a:fld id="{1D8BD707-D9CF-40AE-B4C6-C98DA3205C09}" type="datetimeFigureOut">
               <a:rPr lang="en-US" smtClean="0"/>
-              <a:t>09-Sep-22</a:t>
+              <a:t>13-Jun-23</a:t>
             </a:fld>
             <a:endParaRPr lang="en-US"/>
           </a:p>
@@ -1154,7 +1154,7 @@
           <a:p>
             <a:fld id="{1D8BD707-D9CF-40AE-B4C6-C98DA3205C09}" type="datetimeFigureOut">
               <a:rPr lang="en-US" smtClean="0"/>
-              <a:t>09-Sep-22</a:t>
+              <a:t>13-Jun-23</a:t>
             </a:fld>
             <a:endParaRPr lang="en-US"/>
           </a:p>
@@ -1610,7 +1610,7 @@
           <a:p>
             <a:fld id="{1D8BD707-D9CF-40AE-B4C6-C98DA3205C09}" type="datetimeFigureOut">
               <a:rPr lang="en-US" smtClean="0"/>
-              <a:t>09-Sep-22</a:t>
+              <a:t>13-Jun-23</a:t>
             </a:fld>
             <a:endParaRPr lang="en-US"/>
           </a:p>
@@ -2092,7 +2092,7 @@
           <a:p>
             <a:fld id="{1D8BD707-D9CF-40AE-B4C6-C98DA3205C09}" type="datetimeFigureOut">
               <a:rPr lang="en-US" smtClean="0"/>
-              <a:t>09-Sep-22</a:t>
+              <a:t>13-Jun-23</a:t>
             </a:fld>
             <a:endParaRPr lang="en-US"/>
           </a:p>
@@ -2214,7 +2214,7 @@
           <a:p>
             <a:fld id="{1D8BD707-D9CF-40AE-B4C6-C98DA3205C09}" type="datetimeFigureOut">
               <a:rPr lang="en-US" smtClean="0"/>
-              <a:t>09-Sep-22</a:t>
+              <a:t>13-Jun-23</a:t>
             </a:fld>
             <a:endParaRPr lang="en-US"/>
           </a:p>
@@ -2355,7 +2355,7 @@
           <a:p>
             <a:fld id="{1D8BD707-D9CF-40AE-B4C6-C98DA3205C09}" type="datetimeFigureOut">
               <a:rPr lang="en-US" smtClean="0"/>
-              <a:t>09-Sep-22</a:t>
+              <a:t>13-Jun-23</a:t>
             </a:fld>
             <a:endParaRPr lang="en-US"/>
           </a:p>
@@ -2670,7 +2670,7 @@
           <a:p>
             <a:fld id="{1D8BD707-D9CF-40AE-B4C6-C98DA3205C09}" type="datetimeFigureOut">
               <a:rPr lang="en-US" smtClean="0"/>
-              <a:t>09-Sep-22</a:t>
+              <a:t>13-Jun-23</a:t>
             </a:fld>
             <a:endParaRPr lang="en-US"/>
           </a:p>
@@ -2801,7 +2801,7 @@
           <a:p>
             <a:fld id="{1D8BD707-D9CF-40AE-B4C6-C98DA3205C09}" type="datetimeFigureOut">
               <a:rPr lang="en-US" smtClean="0"/>
-              <a:t>09-Sep-22</a:t>
+              <a:t>13-Jun-23</a:t>
             </a:fld>
             <a:endParaRPr lang="en-US"/>
           </a:p>
@@ -3560,7 +3560,7 @@
           <a:p>
             <a:fld id="{1D8BD707-D9CF-40AE-B4C6-C98DA3205C09}" type="datetimeFigureOut">
               <a:rPr lang="en-US" smtClean="0"/>
-              <a:t>09-Sep-22</a:t>
+              <a:t>13-Jun-23</a:t>
             </a:fld>
             <a:endParaRPr lang="en-US"/>
           </a:p>
@@ -4484,7 +4484,7 @@
           <p:cNvPr id="2" name="Title 1">
             <a:extLst>
               <a:ext uri="{FF2B5EF4-FFF2-40B4-BE49-F238E27FC236}">
-                <a16:creationId xmlns="" xmlns:a16="http://schemas.microsoft.com/office/drawing/2014/main" id="{75EFC13E-9D34-46B2-9C64-0C6AFA7538C1}"/>
+                <a16:creationId xmlns:a16="http://schemas.microsoft.com/office/drawing/2014/main" xmlns="" id="{75EFC13E-9D34-46B2-9C64-0C6AFA7538C1}"/>
               </a:ext>
             </a:extLst>
           </p:cNvPr>
@@ -4514,7 +4514,7 @@
           <p:cNvPr id="3" name="Content Placeholder 2">
             <a:extLst>
               <a:ext uri="{FF2B5EF4-FFF2-40B4-BE49-F238E27FC236}">
-                <a16:creationId xmlns="" xmlns:a16="http://schemas.microsoft.com/office/drawing/2014/main" id="{E79008ED-DFD8-48B0-ABEF-B209CB812BD2}"/>
+                <a16:creationId xmlns:a16="http://schemas.microsoft.com/office/drawing/2014/main" xmlns="" id="{E79008ED-DFD8-48B0-ABEF-B209CB812BD2}"/>
               </a:ext>
             </a:extLst>
           </p:cNvPr>
@@ -4798,7 +4798,7 @@
           <p:cNvPr id="2" name="Title 1">
             <a:extLst>
               <a:ext uri="{FF2B5EF4-FFF2-40B4-BE49-F238E27FC236}">
-                <a16:creationId xmlns="" xmlns:a16="http://schemas.microsoft.com/office/drawing/2014/main" id="{75EFC13E-9D34-46B2-9C64-0C6AFA7538C1}"/>
+                <a16:creationId xmlns:a16="http://schemas.microsoft.com/office/drawing/2014/main" xmlns="" id="{75EFC13E-9D34-46B2-9C64-0C6AFA7538C1}"/>
               </a:ext>
             </a:extLst>
           </p:cNvPr>
@@ -4828,7 +4828,7 @@
           <p:cNvPr id="3" name="Content Placeholder 2">
             <a:extLst>
               <a:ext uri="{FF2B5EF4-FFF2-40B4-BE49-F238E27FC236}">
-                <a16:creationId xmlns="" xmlns:a16="http://schemas.microsoft.com/office/drawing/2014/main" id="{E79008ED-DFD8-48B0-ABEF-B209CB812BD2}"/>
+                <a16:creationId xmlns:a16="http://schemas.microsoft.com/office/drawing/2014/main" xmlns="" id="{E79008ED-DFD8-48B0-ABEF-B209CB812BD2}"/>
               </a:ext>
             </a:extLst>
           </p:cNvPr>
@@ -5200,7 +5200,7 @@
           <p:cNvPr id="2" name="Title 1">
             <a:extLst>
               <a:ext uri="{FF2B5EF4-FFF2-40B4-BE49-F238E27FC236}">
-                <a16:creationId xmlns="" xmlns:a16="http://schemas.microsoft.com/office/drawing/2014/main" id="{75EFC13E-9D34-46B2-9C64-0C6AFA7538C1}"/>
+                <a16:creationId xmlns:a16="http://schemas.microsoft.com/office/drawing/2014/main" xmlns="" id="{75EFC13E-9D34-46B2-9C64-0C6AFA7538C1}"/>
               </a:ext>
             </a:extLst>
           </p:cNvPr>
@@ -5230,7 +5230,7 @@
           <p:cNvPr id="3" name="Content Placeholder 2">
             <a:extLst>
               <a:ext uri="{FF2B5EF4-FFF2-40B4-BE49-F238E27FC236}">
-                <a16:creationId xmlns="" xmlns:a16="http://schemas.microsoft.com/office/drawing/2014/main" id="{E79008ED-DFD8-48B0-ABEF-B209CB812BD2}"/>
+                <a16:creationId xmlns:a16="http://schemas.microsoft.com/office/drawing/2014/main" xmlns="" id="{E79008ED-DFD8-48B0-ABEF-B209CB812BD2}"/>
               </a:ext>
             </a:extLst>
           </p:cNvPr>
@@ -5466,7 +5466,7 @@
           <p:cNvPr id="2" name="Title 1">
             <a:extLst>
               <a:ext uri="{FF2B5EF4-FFF2-40B4-BE49-F238E27FC236}">
-                <a16:creationId xmlns="" xmlns:a16="http://schemas.microsoft.com/office/drawing/2014/main" id="{75EFC13E-9D34-46B2-9C64-0C6AFA7538C1}"/>
+                <a16:creationId xmlns:a16="http://schemas.microsoft.com/office/drawing/2014/main" xmlns="" id="{75EFC13E-9D34-46B2-9C64-0C6AFA7538C1}"/>
               </a:ext>
             </a:extLst>
           </p:cNvPr>
@@ -5496,7 +5496,7 @@
           <p:cNvPr id="3" name="Content Placeholder 2">
             <a:extLst>
               <a:ext uri="{FF2B5EF4-FFF2-40B4-BE49-F238E27FC236}">
-                <a16:creationId xmlns="" xmlns:a16="http://schemas.microsoft.com/office/drawing/2014/main" id="{E79008ED-DFD8-48B0-ABEF-B209CB812BD2}"/>
+                <a16:creationId xmlns:a16="http://schemas.microsoft.com/office/drawing/2014/main" xmlns="" id="{E79008ED-DFD8-48B0-ABEF-B209CB812BD2}"/>
               </a:ext>
             </a:extLst>
           </p:cNvPr>
@@ -5673,7 +5673,7 @@
               <a:buChar char="§"/>
             </a:pPr>
             <a:r>
-              <a:rPr lang="en-US" sz="2000" smtClean="0">
+              <a:rPr lang="en-US" sz="2000" dirty="0" err="1" smtClean="0">
                 <a:latin typeface="Arial" panose="020B0604020202020204" pitchFamily="34" charset="0"/>
                 <a:ea typeface="Calibri" panose="020F0502020204030204" pitchFamily="34" charset="0"/>
                 <a:cs typeface="Arial" panose="020B0604020202020204" pitchFamily="34" charset="0"/>
@@ -5722,7 +5722,31 @@
                 <a:ea typeface="Calibri" panose="020F0502020204030204" pitchFamily="34" charset="0"/>
                 <a:cs typeface="Arial" panose="020B0604020202020204" pitchFamily="34" charset="0"/>
               </a:rPr>
-              <a:t>Building flexbox layout </a:t>
+              <a:t>Building </a:t>
+            </a:r>
+            <a:r>
+              <a:rPr lang="en-US" sz="2000" dirty="0" smtClean="0">
+                <a:latin typeface="Arial" panose="020B0604020202020204" pitchFamily="34" charset="0"/>
+                <a:ea typeface="Calibri" panose="020F0502020204030204" pitchFamily="34" charset="0"/>
+                <a:cs typeface="Arial" panose="020B0604020202020204" pitchFamily="34" charset="0"/>
+              </a:rPr>
+              <a:t>grid</a:t>
+            </a:r>
+            <a:r>
+              <a:rPr lang="en-US" sz="2000" dirty="0" smtClean="0">
+                <a:latin typeface="Arial" panose="020B0604020202020204" pitchFamily="34" charset="0"/>
+                <a:ea typeface="Calibri" panose="020F0502020204030204" pitchFamily="34" charset="0"/>
+                <a:cs typeface="Arial" panose="020B0604020202020204" pitchFamily="34" charset="0"/>
+              </a:rPr>
+              <a:t> </a:t>
+            </a:r>
+            <a:r>
+              <a:rPr lang="en-US" sz="2000" dirty="0">
+                <a:latin typeface="Arial" panose="020B0604020202020204" pitchFamily="34" charset="0"/>
+                <a:ea typeface="Calibri" panose="020F0502020204030204" pitchFamily="34" charset="0"/>
+                <a:cs typeface="Arial" panose="020B0604020202020204" pitchFamily="34" charset="0"/>
+              </a:rPr>
+              <a:t>layout </a:t>
             </a:r>
           </a:p>
           <a:p>
@@ -5769,7 +5793,7 @@
           <p:cNvPr id="2" name="Title 1">
             <a:extLst>
               <a:ext uri="{FF2B5EF4-FFF2-40B4-BE49-F238E27FC236}">
-                <a16:creationId xmlns="" xmlns:a16="http://schemas.microsoft.com/office/drawing/2014/main" id="{75EFC13E-9D34-46B2-9C64-0C6AFA7538C1}"/>
+                <a16:creationId xmlns:a16="http://schemas.microsoft.com/office/drawing/2014/main" xmlns="" id="{75EFC13E-9D34-46B2-9C64-0C6AFA7538C1}"/>
               </a:ext>
             </a:extLst>
           </p:cNvPr>
@@ -5799,7 +5823,7 @@
           <p:cNvPr id="3" name="Content Placeholder 2">
             <a:extLst>
               <a:ext uri="{FF2B5EF4-FFF2-40B4-BE49-F238E27FC236}">
-                <a16:creationId xmlns="" xmlns:a16="http://schemas.microsoft.com/office/drawing/2014/main" id="{E79008ED-DFD8-48B0-ABEF-B209CB812BD2}"/>
+                <a16:creationId xmlns:a16="http://schemas.microsoft.com/office/drawing/2014/main" xmlns="" id="{E79008ED-DFD8-48B0-ABEF-B209CB812BD2}"/>
               </a:ext>
             </a:extLst>
           </p:cNvPr>
@@ -5861,13 +5885,72 @@
               </a:rPr>
               <a:t>Building Simple CSS grid layout </a:t>
             </a:r>
-          </a:p>
-          <a:p>
-            <a:pPr lvl="1" algn="just">
+            <a:endParaRPr lang="en-US" sz="2400" dirty="0">
+              <a:latin typeface="Arial" panose="020B0604020202020204" pitchFamily="34" charset="0"/>
+              <a:cs typeface="Arial" panose="020B0604020202020204" pitchFamily="34" charset="0"/>
+            </a:endParaRPr>
+          </a:p>
+          <a:p>
+            <a:pPr algn="just">
               <a:buFont typeface="Wingdings" panose="05000000000000000000" pitchFamily="2" charset="2"/>
-              <a:buChar char="q"/>
-            </a:pPr>
+              <a:buChar char="§"/>
+            </a:pPr>
+            <a:r>
+              <a:rPr lang="en-US" sz="2000" dirty="0" smtClean="0">
+                <a:latin typeface="Arial" panose="020B0604020202020204" pitchFamily="34" charset="0"/>
+                <a:ea typeface="Calibri" panose="020F0502020204030204" pitchFamily="34" charset="0"/>
+                <a:cs typeface="Arial" panose="020B0604020202020204" pitchFamily="34" charset="0"/>
+              </a:rPr>
+              <a:t>Transition</a:t>
+            </a:r>
+          </a:p>
+          <a:p>
+            <a:pPr algn="just">
+              <a:buFont typeface="Wingdings" panose="05000000000000000000" pitchFamily="2" charset="2"/>
+              <a:buChar char="§"/>
+            </a:pPr>
+            <a:r>
+              <a:rPr lang="en-US" sz="2000" dirty="0" smtClean="0">
+                <a:latin typeface="Arial" panose="020B0604020202020204" pitchFamily="34" charset="0"/>
+                <a:ea typeface="Calibri" panose="020F0502020204030204" pitchFamily="34" charset="0"/>
+                <a:cs typeface="Arial" panose="020B0604020202020204" pitchFamily="34" charset="0"/>
+              </a:rPr>
+              <a:t>Animation</a:t>
+            </a:r>
             <a:endParaRPr lang="en-US" dirty="0"/>
+          </a:p>
+          <a:p>
+            <a:pPr algn="just">
+              <a:buFont typeface="Wingdings" panose="05000000000000000000" pitchFamily="2" charset="2"/>
+              <a:buChar char="§"/>
+            </a:pPr>
+            <a:r>
+              <a:rPr lang="en-US" sz="2000" dirty="0" smtClean="0">
+                <a:latin typeface="Arial" panose="020B0604020202020204" pitchFamily="34" charset="0"/>
+                <a:ea typeface="Calibri" panose="020F0502020204030204" pitchFamily="34" charset="0"/>
+                <a:cs typeface="Arial" panose="020B0604020202020204" pitchFamily="34" charset="0"/>
+              </a:rPr>
+              <a:t>Background image</a:t>
+            </a:r>
+          </a:p>
+          <a:p>
+            <a:pPr algn="just">
+              <a:buFont typeface="Wingdings" panose="05000000000000000000" pitchFamily="2" charset="2"/>
+              <a:buChar char="§"/>
+            </a:pPr>
+            <a:r>
+              <a:rPr lang="en-US" sz="2000" smtClean="0">
+                <a:latin typeface="Arial" panose="020B0604020202020204" pitchFamily="34" charset="0"/>
+                <a:ea typeface="Calibri" panose="020F0502020204030204" pitchFamily="34" charset="0"/>
+                <a:cs typeface="Arial" panose="020B0604020202020204" pitchFamily="34" charset="0"/>
+              </a:rPr>
+              <a:t>Media query</a:t>
+            </a:r>
+            <a:endParaRPr lang="en-US" sz="2000" dirty="0">
+              <a:latin typeface="Arial" panose="020B0604020202020204" pitchFamily="34" charset="0"/>
+              <a:ea typeface="Calibri" panose="020F0502020204030204" pitchFamily="34" charset="0"/>
+              <a:cs typeface="Arial" panose="020B0604020202020204" pitchFamily="34" charset="0"/>
+            </a:endParaRPr>
           </a:p>
         </p:txBody>
       </p:sp>
@@ -6208,7 +6291,7 @@
   <a:extraClrSchemeLst/>
   <a:extLst>
     <a:ext uri="{05A4C25C-085E-4340-85A3-A5531E510DB2}">
-      <thm15:themeFamily xmlns="" xmlns:thm15="http://schemas.microsoft.com/office/thememl/2012/main" name="Office Theme" id="{62F939B6-93AF-4DB8-9C6B-D6C7DFDC589F}" vid="{4A3C46E8-61CC-4603-A589-7422A47A8E4A}"/>
+      <thm15:themeFamily xmlns:thm15="http://schemas.microsoft.com/office/thememl/2012/main" xmlns="" name="Office Theme" id="{62F939B6-93AF-4DB8-9C6B-D6C7DFDC589F}" vid="{4A3C46E8-61CC-4603-A589-7422A47A8E4A}"/>
     </a:ext>
   </a:extLst>
 </a:theme>

</xml_diff>